<commit_message>
deleted extraneous micromamba slides
</commit_message>
<xml_diff>
--- a/wrds/WRDS_authentication.pptx
+++ b/wrds/WRDS_authentication.pptx
@@ -5,23 +5,21 @@
     <p:sldMasterId id="2147483648" r:id="rId1"/>
   </p:sldMasterIdLst>
   <p:notesMasterIdLst>
-    <p:notesMasterId r:id="rId6"/>
+    <p:notesMasterId r:id="rId4"/>
   </p:notesMasterIdLst>
   <p:sldIdLst>
     <p:sldId id="297" r:id="rId2"/>
     <p:sldId id="292" r:id="rId3"/>
-    <p:sldId id="300" r:id="rId4"/>
-    <p:sldId id="299" r:id="rId5"/>
   </p:sldIdLst>
   <p:sldSz cx="9144000" cy="6858000" type="screen4x3"/>
   <p:notesSz cx="7010400" cy="9236075"/>
   <p:embeddedFontLst>
     <p:embeddedFont>
       <p:font typeface="Consolas" panose="020B0609020204030204" pitchFamily="49" charset="0"/>
-      <p:regular r:id="rId7"/>
-      <p:bold r:id="rId8"/>
-      <p:italic r:id="rId9"/>
-      <p:boldItalic r:id="rId10"/>
+      <p:regular r:id="rId5"/>
+      <p:bold r:id="rId6"/>
+      <p:italic r:id="rId7"/>
+      <p:boldItalic r:id="rId8"/>
     </p:embeddedFont>
   </p:embeddedFontLst>
   <p:defaultTextStyle>
@@ -272,7 +270,7 @@
       <p15:notesGuideLst xmlns:p15="http://schemas.microsoft.com/office/powerpoint/2012/main"/>
     </p:ext>
     <p:ext uri="http://customooxmlschemas.google.com/">
-      <go:slidesCustomData xmlns:go="http://customooxmlschemas.google.com/" xmlns:ahyp="http://schemas.microsoft.com/office/drawing/2018/hyperlinkcolor" xmlns:p15="http://schemas.microsoft.com/office/powerpoint/2012/main" xmlns:p14="http://schemas.microsoft.com/office/powerpoint/2010/main" xmlns:com="http://schemas.openxmlformats.org/drawingml/2006/compatibility" xmlns:pvml="urn:schemas-microsoft-com:office:powerpoint" xmlns:v="urn:schemas-microsoft-com:vml" xmlns:o="urn:schemas-microsoft-com:office:office" xmlns:dgm="http://schemas.openxmlformats.org/drawingml/2006/diagram" xmlns:c="http://schemas.openxmlformats.org/drawingml/2006/chart" xmlns:mv="urn:schemas-microsoft-com:mac:vml" xmlns:mc="http://schemas.openxmlformats.org/markup-compatibility/2006" xmlns="" r:id="rId40" roundtripDataSignature="AMtx7mgJb/dxg8SBACTioISI2Z3PoJo6hg=="/>
+      <go:slidesCustomData xmlns="" xmlns:mc="http://schemas.openxmlformats.org/markup-compatibility/2006" xmlns:mv="urn:schemas-microsoft-com:mac:vml" xmlns:c="http://schemas.openxmlformats.org/drawingml/2006/chart" xmlns:dgm="http://schemas.openxmlformats.org/drawingml/2006/diagram" xmlns:o="urn:schemas-microsoft-com:office:office" xmlns:v="urn:schemas-microsoft-com:vml" xmlns:pvml="urn:schemas-microsoft-com:office:powerpoint" xmlns:com="http://schemas.openxmlformats.org/drawingml/2006/compatibility" xmlns:p14="http://schemas.microsoft.com/office/powerpoint/2010/main" xmlns:p15="http://schemas.microsoft.com/office/powerpoint/2012/main" xmlns:ahyp="http://schemas.microsoft.com/office/drawing/2018/hyperlinkcolor" xmlns:go="http://customooxmlschemas.google.com/" r:id="rId40" roundtripDataSignature="AMtx7mgJb/dxg8SBACTioISI2Z3PoJo6hg=="/>
     </p:ext>
   </p:extLst>
 </p:presentation>
@@ -1899,360 +1897,6 @@
     <p:extLst>
       <p:ext uri="{BB962C8B-B14F-4D97-AF65-F5344CB8AC3E}">
         <p14:creationId xmlns:p14="http://schemas.microsoft.com/office/powerpoint/2010/main" val="1390414966"/>
-      </p:ext>
-    </p:extLst>
-  </p:cSld>
-  <p:clrMapOvr>
-    <a:masterClrMapping/>
-  </p:clrMapOvr>
-</p:notes>
-</file>
-
-<file path=ppt/notesSlides/notesSlide2.xml><?xml version="1.0" encoding="utf-8"?>
-<p:notes xmlns:a="http://schemas.openxmlformats.org/drawingml/2006/main" xmlns:r="http://schemas.openxmlformats.org/officeDocument/2006/relationships" xmlns:p="http://schemas.openxmlformats.org/presentationml/2006/main" showMasterSp="0" showMasterPhAnim="0">
-  <p:cSld>
-    <p:spTree>
-      <p:nvGrpSpPr>
-        <p:cNvPr id="1" name="Shape 125"/>
-        <p:cNvGrpSpPr/>
-        <p:nvPr/>
-      </p:nvGrpSpPr>
-      <p:grpSpPr>
-        <a:xfrm>
-          <a:off x="0" y="0"/>
-          <a:ext cx="0" cy="0"/>
-          <a:chOff x="0" y="0"/>
-          <a:chExt cx="0" cy="0"/>
-        </a:xfrm>
-      </p:grpSpPr>
-      <p:sp>
-        <p:nvSpPr>
-          <p:cNvPr id="126" name="Google Shape;126;ge6d407e7a1_0_85:notes"/>
-          <p:cNvSpPr>
-            <a:spLocks noGrp="1" noRot="1" noChangeAspect="1"/>
-          </p:cNvSpPr>
-          <p:nvPr>
-            <p:ph type="sldImg" idx="2"/>
-          </p:nvPr>
-        </p:nvSpPr>
-        <p:spPr>
-          <a:xfrm>
-            <a:off x="1195388" y="692150"/>
-            <a:ext cx="4619625" cy="3463925"/>
-          </a:xfrm>
-          <a:custGeom>
-            <a:avLst/>
-            <a:gdLst/>
-            <a:ahLst/>
-            <a:cxnLst/>
-            <a:rect l="l" t="t" r="r" b="b"/>
-            <a:pathLst>
-              <a:path w="120000" h="120000" extrusionOk="0">
-                <a:moveTo>
-                  <a:pt x="0" y="0"/>
-                </a:moveTo>
-                <a:lnTo>
-                  <a:pt x="120000" y="0"/>
-                </a:lnTo>
-                <a:lnTo>
-                  <a:pt x="120000" y="120000"/>
-                </a:lnTo>
-                <a:lnTo>
-                  <a:pt x="0" y="120000"/>
-                </a:lnTo>
-                <a:close/>
-              </a:path>
-            </a:pathLst>
-          </a:custGeom>
-          <a:noFill/>
-          <a:ln w="12700" cap="flat" cmpd="sng">
-            <a:solidFill>
-              <a:srgbClr val="000000"/>
-            </a:solidFill>
-            <a:prstDash val="solid"/>
-            <a:round/>
-            <a:headEnd type="none" w="sm" len="sm"/>
-            <a:tailEnd type="none" w="sm" len="sm"/>
-          </a:ln>
-        </p:spPr>
-      </p:sp>
-      <p:sp>
-        <p:nvSpPr>
-          <p:cNvPr id="127" name="Google Shape;127;ge6d407e7a1_0_85:notes"/>
-          <p:cNvSpPr txBox="1">
-            <a:spLocks noGrp="1"/>
-          </p:cNvSpPr>
-          <p:nvPr>
-            <p:ph type="body" idx="1"/>
-          </p:nvPr>
-        </p:nvSpPr>
-        <p:spPr>
-          <a:xfrm>
-            <a:off x="701040" y="4387136"/>
-            <a:ext cx="5608200" cy="4156200"/>
-          </a:xfrm>
-          <a:prstGeom prst="rect">
-            <a:avLst/>
-          </a:prstGeom>
-          <a:noFill/>
-          <a:ln>
-            <a:noFill/>
-          </a:ln>
-        </p:spPr>
-        <p:txBody>
-          <a:bodyPr spcFirstLastPara="1" wrap="square" lIns="93175" tIns="46575" rIns="93175" bIns="46575" anchor="t" anchorCtr="0">
-            <a:noAutofit/>
-          </a:bodyPr>
-          <a:lstStyle/>
-          <a:p>
-            <a:pPr marL="0" lvl="0" indent="0" algn="l" rtl="0">
-              <a:lnSpc>
-                <a:spcPct val="100000"/>
-              </a:lnSpc>
-              <a:spcBef>
-                <a:spcPts val="0"/>
-              </a:spcBef>
-              <a:spcAft>
-                <a:spcPts val="0"/>
-              </a:spcAft>
-              <a:buSzPts val="1400"/>
-              <a:buNone/>
-            </a:pPr>
-            <a:endParaRPr dirty="0"/>
-          </a:p>
-        </p:txBody>
-      </p:sp>
-      <p:sp>
-        <p:nvSpPr>
-          <p:cNvPr id="128" name="Google Shape;128;ge6d407e7a1_0_85:notes"/>
-          <p:cNvSpPr txBox="1">
-            <a:spLocks noGrp="1"/>
-          </p:cNvSpPr>
-          <p:nvPr>
-            <p:ph type="sldNum" idx="12"/>
-          </p:nvPr>
-        </p:nvSpPr>
-        <p:spPr>
-          <a:xfrm>
-            <a:off x="3970938" y="8772669"/>
-            <a:ext cx="3037800" cy="461700"/>
-          </a:xfrm>
-          <a:prstGeom prst="rect">
-            <a:avLst/>
-          </a:prstGeom>
-          <a:noFill/>
-          <a:ln>
-            <a:noFill/>
-          </a:ln>
-        </p:spPr>
-        <p:txBody>
-          <a:bodyPr spcFirstLastPara="1" wrap="square" lIns="93175" tIns="46575" rIns="93175" bIns="46575" anchor="b" anchorCtr="0">
-            <a:noAutofit/>
-          </a:bodyPr>
-          <a:lstStyle/>
-          <a:p>
-            <a:pPr marL="0" lvl="0" indent="0" algn="r" rtl="0">
-              <a:lnSpc>
-                <a:spcPct val="100000"/>
-              </a:lnSpc>
-              <a:spcBef>
-                <a:spcPts val="0"/>
-              </a:spcBef>
-              <a:spcAft>
-                <a:spcPts val="0"/>
-              </a:spcAft>
-              <a:buSzPts val="1400"/>
-              <a:buNone/>
-            </a:pPr>
-            <a:fld id="{00000000-1234-1234-1234-123412341234}" type="slidenum">
-              <a:rPr lang="en-US"/>
-              <a:t>3</a:t>
-            </a:fld>
-            <a:endParaRPr/>
-          </a:p>
-        </p:txBody>
-      </p:sp>
-    </p:spTree>
-    <p:extLst>
-      <p:ext uri="{BB962C8B-B14F-4D97-AF65-F5344CB8AC3E}">
-        <p14:creationId xmlns:p14="http://schemas.microsoft.com/office/powerpoint/2010/main" val="247320636"/>
-      </p:ext>
-    </p:extLst>
-  </p:cSld>
-  <p:clrMapOvr>
-    <a:masterClrMapping/>
-  </p:clrMapOvr>
-</p:notes>
-</file>
-
-<file path=ppt/notesSlides/notesSlide3.xml><?xml version="1.0" encoding="utf-8"?>
-<p:notes xmlns:a="http://schemas.openxmlformats.org/drawingml/2006/main" xmlns:r="http://schemas.openxmlformats.org/officeDocument/2006/relationships" xmlns:p="http://schemas.openxmlformats.org/presentationml/2006/main" showMasterSp="0" showMasterPhAnim="0">
-  <p:cSld>
-    <p:spTree>
-      <p:nvGrpSpPr>
-        <p:cNvPr id="1" name="Shape 125"/>
-        <p:cNvGrpSpPr/>
-        <p:nvPr/>
-      </p:nvGrpSpPr>
-      <p:grpSpPr>
-        <a:xfrm>
-          <a:off x="0" y="0"/>
-          <a:ext cx="0" cy="0"/>
-          <a:chOff x="0" y="0"/>
-          <a:chExt cx="0" cy="0"/>
-        </a:xfrm>
-      </p:grpSpPr>
-      <p:sp>
-        <p:nvSpPr>
-          <p:cNvPr id="126" name="Google Shape;126;ge6d407e7a1_0_85:notes"/>
-          <p:cNvSpPr>
-            <a:spLocks noGrp="1" noRot="1" noChangeAspect="1"/>
-          </p:cNvSpPr>
-          <p:nvPr>
-            <p:ph type="sldImg" idx="2"/>
-          </p:nvPr>
-        </p:nvSpPr>
-        <p:spPr>
-          <a:xfrm>
-            <a:off x="1195388" y="692150"/>
-            <a:ext cx="4619625" cy="3463925"/>
-          </a:xfrm>
-          <a:custGeom>
-            <a:avLst/>
-            <a:gdLst/>
-            <a:ahLst/>
-            <a:cxnLst/>
-            <a:rect l="l" t="t" r="r" b="b"/>
-            <a:pathLst>
-              <a:path w="120000" h="120000" extrusionOk="0">
-                <a:moveTo>
-                  <a:pt x="0" y="0"/>
-                </a:moveTo>
-                <a:lnTo>
-                  <a:pt x="120000" y="0"/>
-                </a:lnTo>
-                <a:lnTo>
-                  <a:pt x="120000" y="120000"/>
-                </a:lnTo>
-                <a:lnTo>
-                  <a:pt x="0" y="120000"/>
-                </a:lnTo>
-                <a:close/>
-              </a:path>
-            </a:pathLst>
-          </a:custGeom>
-          <a:noFill/>
-          <a:ln w="12700" cap="flat" cmpd="sng">
-            <a:solidFill>
-              <a:srgbClr val="000000"/>
-            </a:solidFill>
-            <a:prstDash val="solid"/>
-            <a:round/>
-            <a:headEnd type="none" w="sm" len="sm"/>
-            <a:tailEnd type="none" w="sm" len="sm"/>
-          </a:ln>
-        </p:spPr>
-      </p:sp>
-      <p:sp>
-        <p:nvSpPr>
-          <p:cNvPr id="127" name="Google Shape;127;ge6d407e7a1_0_85:notes"/>
-          <p:cNvSpPr txBox="1">
-            <a:spLocks noGrp="1"/>
-          </p:cNvSpPr>
-          <p:nvPr>
-            <p:ph type="body" idx="1"/>
-          </p:nvPr>
-        </p:nvSpPr>
-        <p:spPr>
-          <a:xfrm>
-            <a:off x="701040" y="4387136"/>
-            <a:ext cx="5608200" cy="4156200"/>
-          </a:xfrm>
-          <a:prstGeom prst="rect">
-            <a:avLst/>
-          </a:prstGeom>
-          <a:noFill/>
-          <a:ln>
-            <a:noFill/>
-          </a:ln>
-        </p:spPr>
-        <p:txBody>
-          <a:bodyPr spcFirstLastPara="1" wrap="square" lIns="93175" tIns="46575" rIns="93175" bIns="46575" anchor="t" anchorCtr="0">
-            <a:noAutofit/>
-          </a:bodyPr>
-          <a:lstStyle/>
-          <a:p>
-            <a:pPr marL="0" lvl="0" indent="0" algn="l" rtl="0">
-              <a:lnSpc>
-                <a:spcPct val="100000"/>
-              </a:lnSpc>
-              <a:spcBef>
-                <a:spcPts val="0"/>
-              </a:spcBef>
-              <a:spcAft>
-                <a:spcPts val="0"/>
-              </a:spcAft>
-              <a:buSzPts val="1400"/>
-              <a:buNone/>
-            </a:pPr>
-            <a:endParaRPr dirty="0"/>
-          </a:p>
-        </p:txBody>
-      </p:sp>
-      <p:sp>
-        <p:nvSpPr>
-          <p:cNvPr id="128" name="Google Shape;128;ge6d407e7a1_0_85:notes"/>
-          <p:cNvSpPr txBox="1">
-            <a:spLocks noGrp="1"/>
-          </p:cNvSpPr>
-          <p:nvPr>
-            <p:ph type="sldNum" idx="12"/>
-          </p:nvPr>
-        </p:nvSpPr>
-        <p:spPr>
-          <a:xfrm>
-            <a:off x="3970938" y="8772669"/>
-            <a:ext cx="3037800" cy="461700"/>
-          </a:xfrm>
-          <a:prstGeom prst="rect">
-            <a:avLst/>
-          </a:prstGeom>
-          <a:noFill/>
-          <a:ln>
-            <a:noFill/>
-          </a:ln>
-        </p:spPr>
-        <p:txBody>
-          <a:bodyPr spcFirstLastPara="1" wrap="square" lIns="93175" tIns="46575" rIns="93175" bIns="46575" anchor="b" anchorCtr="0">
-            <a:noAutofit/>
-          </a:bodyPr>
-          <a:lstStyle/>
-          <a:p>
-            <a:pPr marL="0" lvl="0" indent="0" algn="r" rtl="0">
-              <a:lnSpc>
-                <a:spcPct val="100000"/>
-              </a:lnSpc>
-              <a:spcBef>
-                <a:spcPts val="0"/>
-              </a:spcBef>
-              <a:spcAft>
-                <a:spcPts val="0"/>
-              </a:spcAft>
-              <a:buSzPts val="1400"/>
-              <a:buNone/>
-            </a:pPr>
-            <a:fld id="{00000000-1234-1234-1234-123412341234}" type="slidenum">
-              <a:rPr lang="en-US"/>
-              <a:t>4</a:t>
-            </a:fld>
-            <a:endParaRPr/>
-          </a:p>
-        </p:txBody>
-      </p:sp>
-    </p:spTree>
-    <p:extLst>
-      <p:ext uri="{BB962C8B-B14F-4D97-AF65-F5344CB8AC3E}">
-        <p14:creationId xmlns:p14="http://schemas.microsoft.com/office/powerpoint/2010/main" val="328021311"/>
       </p:ext>
     </p:extLst>
   </p:cSld>
@@ -8149,8 +7793,8 @@
         </p:nvSpPr>
         <p:spPr>
           <a:xfrm>
-            <a:off x="554324" y="873125"/>
-            <a:ext cx="8386475" cy="4955172"/>
+            <a:off x="508375" y="1032564"/>
+            <a:ext cx="8386475" cy="5740003"/>
           </a:xfrm>
           <a:prstGeom prst="rect">
             <a:avLst/>
@@ -8212,6 +7856,15 @@
               <a:buSzPts val="1100"/>
             </a:pPr>
             <a:endParaRPr sz="1700" dirty="0"/>
+          </a:p>
+          <a:p>
+            <a:endParaRPr lang="en-US" sz="1700" dirty="0"/>
+          </a:p>
+          <a:p>
+            <a:endParaRPr lang="en-US" sz="1700" dirty="0"/>
+          </a:p>
+          <a:p>
+            <a:endParaRPr lang="en-US" sz="1700" dirty="0"/>
           </a:p>
           <a:p>
             <a:endParaRPr lang="en-US" sz="1700" dirty="0"/>
@@ -8456,7 +8109,7 @@
         </p:nvSpPr>
         <p:spPr>
           <a:xfrm>
-            <a:off x="554324" y="3208245"/>
+            <a:off x="554324" y="4101403"/>
             <a:ext cx="3316110" cy="624102"/>
           </a:xfrm>
           <a:prstGeom prst="flowChartAlternateProcess">
@@ -8536,1498 +8189,6 @@
     <p:extLst>
       <p:ext uri="{BB962C8B-B14F-4D97-AF65-F5344CB8AC3E}">
         <p14:creationId xmlns:p14="http://schemas.microsoft.com/office/powerpoint/2010/main" val="2208496741"/>
-      </p:ext>
-    </p:extLst>
-  </p:cSld>
-  <p:clrMapOvr>
-    <a:masterClrMapping/>
-  </p:clrMapOvr>
-</p:sld>
-</file>
-
-<file path=ppt/slides/slide3.xml><?xml version="1.0" encoding="utf-8"?>
-<p:sld xmlns:a="http://schemas.openxmlformats.org/drawingml/2006/main" xmlns:r="http://schemas.openxmlformats.org/officeDocument/2006/relationships" xmlns:p="http://schemas.openxmlformats.org/presentationml/2006/main">
-  <p:cSld>
-    <p:spTree>
-      <p:nvGrpSpPr>
-        <p:cNvPr id="1" name="Shape 129"/>
-        <p:cNvGrpSpPr/>
-        <p:nvPr/>
-      </p:nvGrpSpPr>
-      <p:grpSpPr>
-        <a:xfrm>
-          <a:off x="0" y="0"/>
-          <a:ext cx="0" cy="0"/>
-          <a:chOff x="0" y="0"/>
-          <a:chExt cx="0" cy="0"/>
-        </a:xfrm>
-      </p:grpSpPr>
-      <p:sp>
-        <p:nvSpPr>
-          <p:cNvPr id="130" name="Google Shape;130;ge6d407e7a1_0_85"/>
-          <p:cNvSpPr txBox="1">
-            <a:spLocks noGrp="1"/>
-          </p:cNvSpPr>
-          <p:nvPr>
-            <p:ph type="title"/>
-          </p:nvPr>
-        </p:nvSpPr>
-        <p:spPr>
-          <a:xfrm>
-            <a:off x="457200" y="0"/>
-            <a:ext cx="8645700" cy="1143000"/>
-          </a:xfrm>
-          <a:prstGeom prst="rect">
-            <a:avLst/>
-          </a:prstGeom>
-          <a:noFill/>
-          <a:ln>
-            <a:noFill/>
-          </a:ln>
-        </p:spPr>
-        <p:txBody>
-          <a:bodyPr spcFirstLastPara="1" wrap="square" lIns="91425" tIns="45700" rIns="91425" bIns="45700" anchor="ctr" anchorCtr="0">
-            <a:noAutofit/>
-          </a:bodyPr>
-          <a:lstStyle/>
-          <a:p>
-            <a:pPr marL="0" lvl="0" indent="0" algn="l" rtl="0">
-              <a:lnSpc>
-                <a:spcPct val="100000"/>
-              </a:lnSpc>
-              <a:spcBef>
-                <a:spcPts val="0"/>
-              </a:spcBef>
-              <a:spcAft>
-                <a:spcPts val="0"/>
-              </a:spcAft>
-              <a:buSzPts val="3200"/>
-              <a:buNone/>
-            </a:pPr>
-            <a:r>
-              <a:rPr lang="en-US" dirty="0"/>
-              <a:t>Creating a </a:t>
-            </a:r>
-            <a:r>
-              <a:rPr lang="en-US" dirty="0" err="1"/>
-              <a:t>Conda</a:t>
-            </a:r>
-            <a:r>
-              <a:rPr lang="en-US" dirty="0"/>
-              <a:t> Environment (</a:t>
-            </a:r>
-            <a:r>
-              <a:rPr lang="en-US" dirty="0" err="1"/>
-              <a:t>yaml</a:t>
-            </a:r>
-            <a:r>
-              <a:rPr lang="en-US" dirty="0"/>
-              <a:t> file)</a:t>
-            </a:r>
-            <a:endParaRPr dirty="0"/>
-          </a:p>
-        </p:txBody>
-      </p:sp>
-      <p:sp>
-        <p:nvSpPr>
-          <p:cNvPr id="132" name="Google Shape;132;ge6d407e7a1_0_85"/>
-          <p:cNvSpPr txBox="1">
-            <a:spLocks noGrp="1"/>
-          </p:cNvSpPr>
-          <p:nvPr>
-            <p:ph type="sldNum" idx="12"/>
-          </p:nvPr>
-        </p:nvSpPr>
-        <p:spPr>
-          <a:xfrm>
-            <a:off x="8686800" y="6506896"/>
-            <a:ext cx="416100" cy="365100"/>
-          </a:xfrm>
-          <a:prstGeom prst="rect">
-            <a:avLst/>
-          </a:prstGeom>
-          <a:noFill/>
-          <a:ln>
-            <a:noFill/>
-          </a:ln>
-        </p:spPr>
-        <p:txBody>
-          <a:bodyPr spcFirstLastPara="1" wrap="square" lIns="91425" tIns="45700" rIns="91425" bIns="45700" anchor="ctr" anchorCtr="0">
-            <a:noAutofit/>
-          </a:bodyPr>
-          <a:lstStyle/>
-          <a:p>
-            <a:pPr marL="0" lvl="0" indent="0" algn="r" rtl="0">
-              <a:lnSpc>
-                <a:spcPct val="100000"/>
-              </a:lnSpc>
-              <a:spcBef>
-                <a:spcPts val="0"/>
-              </a:spcBef>
-              <a:spcAft>
-                <a:spcPts val="0"/>
-              </a:spcAft>
-              <a:buSzPts val="1000"/>
-              <a:buNone/>
-            </a:pPr>
-            <a:fld id="{00000000-1234-1234-1234-123412341234}" type="slidenum">
-              <a:rPr lang="en-US"/>
-              <a:t>3</a:t>
-            </a:fld>
-            <a:endParaRPr/>
-          </a:p>
-        </p:txBody>
-      </p:sp>
-      <p:sp>
-        <p:nvSpPr>
-          <p:cNvPr id="133" name="Google Shape;133;ge6d407e7a1_0_85"/>
-          <p:cNvSpPr txBox="1"/>
-          <p:nvPr/>
-        </p:nvSpPr>
-        <p:spPr>
-          <a:xfrm>
-            <a:off x="554324" y="873125"/>
-            <a:ext cx="8386475" cy="4616618"/>
-          </a:xfrm>
-          <a:prstGeom prst="rect">
-            <a:avLst/>
-          </a:prstGeom>
-          <a:noFill/>
-          <a:ln>
-            <a:noFill/>
-          </a:ln>
-        </p:spPr>
-        <p:txBody>
-          <a:bodyPr spcFirstLastPara="1" wrap="square" lIns="91425" tIns="91425" rIns="91425" bIns="91425" anchor="t" anchorCtr="0">
-            <a:spAutoFit/>
-          </a:bodyPr>
-          <a:lstStyle/>
-          <a:p>
-            <a:pPr>
-              <a:buClr>
-                <a:schemeClr val="dk1"/>
-              </a:buClr>
-              <a:buSzPts val="1100"/>
-            </a:pPr>
-            <a:r>
-              <a:rPr lang="en-US" sz="1800" dirty="0"/>
-              <a:t>To follow along with what we are doing today, you can create a new </a:t>
-            </a:r>
-            <a:r>
-              <a:rPr lang="en-US" sz="1800" dirty="0" err="1"/>
-              <a:t>conda</a:t>
-            </a:r>
-            <a:r>
-              <a:rPr lang="en-US" sz="1800" dirty="0"/>
-              <a:t> environment in your home directory with the following:</a:t>
-            </a:r>
-          </a:p>
-          <a:p>
-            <a:pPr>
-              <a:buClr>
-                <a:schemeClr val="dk1"/>
-              </a:buClr>
-              <a:buSzPts val="1100"/>
-            </a:pPr>
-            <a:endParaRPr lang="en-US" sz="1800" dirty="0"/>
-          </a:p>
-          <a:p>
-            <a:pPr marL="920750" lvl="4">
-              <a:buClr>
-                <a:schemeClr val="dk1"/>
-              </a:buClr>
-              <a:buSzPts val="1100"/>
-            </a:pPr>
-            <a:r>
-              <a:rPr lang="en-US" sz="1800" dirty="0">
-                <a:solidFill>
-                  <a:schemeClr val="dk1"/>
-                </a:solidFill>
-                <a:highlight>
-                  <a:srgbClr val="C0C0C0"/>
-                </a:highlight>
-                <a:latin typeface="Consolas"/>
-                <a:cs typeface="Consolas"/>
-              </a:rPr>
-              <a:t>git clone </a:t>
-            </a:r>
-            <a:r>
-              <a:rPr lang="en-US" sz="1800" dirty="0">
-                <a:solidFill>
-                  <a:schemeClr val="dk1"/>
-                </a:solidFill>
-                <a:highlight>
-                  <a:srgbClr val="C0C0C0"/>
-                </a:highlight>
-                <a:latin typeface="Consolas"/>
-                <a:cs typeface="Consolas"/>
-                <a:hlinkClick r:id="rId3"/>
-              </a:rPr>
-              <a:t>https://github.com/rs-kellogg/2024_phd_workshop</a:t>
-            </a:r>
-            <a:endParaRPr lang="en-US" sz="1800" dirty="0">
-              <a:solidFill>
-                <a:schemeClr val="dk1"/>
-              </a:solidFill>
-              <a:highlight>
-                <a:srgbClr val="C0C0C0"/>
-              </a:highlight>
-              <a:latin typeface="Consolas"/>
-              <a:cs typeface="Consolas"/>
-            </a:endParaRPr>
-          </a:p>
-          <a:p>
-            <a:pPr marL="920750" lvl="4">
-              <a:buClr>
-                <a:schemeClr val="dk1"/>
-              </a:buClr>
-              <a:buSzPts val="1100"/>
-            </a:pPr>
-            <a:r>
-              <a:rPr lang="en-US" sz="1800" dirty="0">
-                <a:solidFill>
-                  <a:schemeClr val="dk1"/>
-                </a:solidFill>
-                <a:highlight>
-                  <a:srgbClr val="C0C0C0"/>
-                </a:highlight>
-                <a:latin typeface="Consolas"/>
-                <a:cs typeface="Consolas"/>
-              </a:rPr>
-              <a:t>cd </a:t>
-            </a:r>
-            <a:r>
-              <a:rPr lang="en-US" sz="1800" dirty="0" err="1">
-                <a:solidFill>
-                  <a:schemeClr val="dk1"/>
-                </a:solidFill>
-                <a:highlight>
-                  <a:srgbClr val="C0C0C0"/>
-                </a:highlight>
-                <a:latin typeface="Consolas"/>
-                <a:cs typeface="Consolas"/>
-              </a:rPr>
-              <a:t>wrds</a:t>
-            </a:r>
-            <a:r>
-              <a:rPr lang="en-US" sz="1800" dirty="0">
-                <a:solidFill>
-                  <a:schemeClr val="dk1"/>
-                </a:solidFill>
-                <a:highlight>
-                  <a:srgbClr val="C0C0C0"/>
-                </a:highlight>
-                <a:latin typeface="Consolas"/>
-                <a:cs typeface="Consolas"/>
-              </a:rPr>
-              <a:t> </a:t>
-            </a:r>
-            <a:endParaRPr lang="en-US" sz="1800" dirty="0"/>
-          </a:p>
-          <a:p>
-            <a:pPr marL="920750" lvl="4">
-              <a:buClr>
-                <a:schemeClr val="dk1"/>
-              </a:buClr>
-              <a:buSzPts val="1100"/>
-            </a:pPr>
-            <a:r>
-              <a:rPr lang="en-US" sz="1800" dirty="0">
-                <a:solidFill>
-                  <a:schemeClr val="dk1"/>
-                </a:solidFill>
-                <a:highlight>
-                  <a:srgbClr val="C0C0C0"/>
-                </a:highlight>
-                <a:latin typeface="Consolas"/>
-                <a:cs typeface="Consolas"/>
-              </a:rPr>
-              <a:t>module load </a:t>
-            </a:r>
-            <a:r>
-              <a:rPr lang="en-US" sz="1800" dirty="0" err="1">
-                <a:solidFill>
-                  <a:schemeClr val="dk1"/>
-                </a:solidFill>
-                <a:highlight>
-                  <a:srgbClr val="C0C0C0"/>
-                </a:highlight>
-                <a:latin typeface="Consolas"/>
-                <a:cs typeface="Consolas"/>
-              </a:rPr>
-              <a:t>micromamba</a:t>
-            </a:r>
-            <a:endParaRPr lang="en-US" sz="1800" dirty="0">
-              <a:solidFill>
-                <a:schemeClr val="dk1"/>
-              </a:solidFill>
-              <a:highlight>
-                <a:srgbClr val="C0C0C0"/>
-              </a:highlight>
-              <a:latin typeface="Consolas"/>
-              <a:cs typeface="Consolas"/>
-            </a:endParaRPr>
-          </a:p>
-          <a:p>
-            <a:pPr lvl="4" indent="920750">
-              <a:buClr>
-                <a:schemeClr val="dk1"/>
-              </a:buClr>
-              <a:buSzPts val="1100"/>
-            </a:pPr>
-            <a:r>
-              <a:rPr lang="en-US" sz="1800" dirty="0" err="1">
-                <a:solidFill>
-                  <a:schemeClr val="dk1"/>
-                </a:solidFill>
-                <a:highlight>
-                  <a:srgbClr val="C0C0C0"/>
-                </a:highlight>
-                <a:latin typeface="Consolas"/>
-                <a:cs typeface="Consolas"/>
-                <a:sym typeface="Consolas"/>
-              </a:rPr>
-              <a:t>micromamba</a:t>
-            </a:r>
-            <a:r>
-              <a:rPr lang="en-US" sz="1800" dirty="0">
-                <a:solidFill>
-                  <a:schemeClr val="dk1"/>
-                </a:solidFill>
-                <a:highlight>
-                  <a:srgbClr val="C0C0C0"/>
-                </a:highlight>
-                <a:latin typeface="Consolas"/>
-                <a:ea typeface="Consolas"/>
-                <a:cs typeface="Consolas"/>
-                <a:sym typeface="Consolas"/>
-              </a:rPr>
-              <a:t> env create -f wrds2_env.yml</a:t>
-            </a:r>
-          </a:p>
-          <a:p>
-            <a:pPr lvl="4" indent="920750">
-              <a:buClr>
-                <a:schemeClr val="dk1"/>
-              </a:buClr>
-              <a:buSzPts val="1100"/>
-            </a:pPr>
-            <a:r>
-              <a:rPr lang="en-US" sz="1800" dirty="0" err="1">
-                <a:solidFill>
-                  <a:schemeClr val="dk1"/>
-                </a:solidFill>
-                <a:highlight>
-                  <a:srgbClr val="C0C0C0"/>
-                </a:highlight>
-                <a:latin typeface="Consolas"/>
-                <a:ea typeface="Consolas"/>
-                <a:cs typeface="Consolas"/>
-                <a:sym typeface="Consolas"/>
-              </a:rPr>
-              <a:t>micromamba</a:t>
-            </a:r>
-            <a:r>
-              <a:rPr lang="en-US" sz="1800" dirty="0">
-                <a:solidFill>
-                  <a:schemeClr val="dk1"/>
-                </a:solidFill>
-                <a:highlight>
-                  <a:srgbClr val="C0C0C0"/>
-                </a:highlight>
-                <a:latin typeface="Consolas"/>
-                <a:ea typeface="Consolas"/>
-                <a:cs typeface="Consolas"/>
-                <a:sym typeface="Consolas"/>
-              </a:rPr>
-              <a:t> activate wrds2_env</a:t>
-            </a:r>
-          </a:p>
-          <a:p>
-            <a:pPr lvl="4" indent="920750">
-              <a:buClr>
-                <a:schemeClr val="dk1"/>
-              </a:buClr>
-              <a:buSzPts val="1100"/>
-            </a:pPr>
-            <a:r>
-              <a:rPr lang="en-US" sz="1800" dirty="0">
-                <a:solidFill>
-                  <a:schemeClr val="dk1"/>
-                </a:solidFill>
-                <a:highlight>
-                  <a:srgbClr val="C0C0C0"/>
-                </a:highlight>
-                <a:latin typeface="Consolas"/>
-                <a:ea typeface="Consolas"/>
-                <a:cs typeface="Consolas"/>
-                <a:sym typeface="Consolas"/>
-              </a:rPr>
-              <a:t>mamba install </a:t>
-            </a:r>
-            <a:r>
-              <a:rPr lang="en-US" sz="1800" dirty="0" err="1">
-                <a:solidFill>
-                  <a:schemeClr val="dk1"/>
-                </a:solidFill>
-                <a:highlight>
-                  <a:srgbClr val="C0C0C0"/>
-                </a:highlight>
-                <a:latin typeface="Consolas"/>
-                <a:ea typeface="Consolas"/>
-                <a:cs typeface="Consolas"/>
-                <a:sym typeface="Consolas"/>
-              </a:rPr>
-              <a:t>rstudio</a:t>
-            </a:r>
-            <a:r>
-              <a:rPr lang="en-US" sz="1800" dirty="0">
-                <a:solidFill>
-                  <a:schemeClr val="dk1"/>
-                </a:solidFill>
-                <a:highlight>
-                  <a:srgbClr val="C0C0C0"/>
-                </a:highlight>
-                <a:latin typeface="Consolas"/>
-                <a:ea typeface="Consolas"/>
-                <a:cs typeface="Consolas"/>
-                <a:sym typeface="Consolas"/>
-              </a:rPr>
-              <a:t>-desktop</a:t>
-            </a:r>
-          </a:p>
-          <a:p>
-            <a:pPr lvl="4" indent="920750">
-              <a:buClr>
-                <a:schemeClr val="dk1"/>
-              </a:buClr>
-              <a:buSzPts val="1100"/>
-            </a:pPr>
-            <a:endParaRPr lang="en-US" sz="1800" dirty="0">
-              <a:solidFill>
-                <a:schemeClr val="dk1"/>
-              </a:solidFill>
-              <a:highlight>
-                <a:srgbClr val="C0C0C0"/>
-              </a:highlight>
-              <a:latin typeface="Consolas"/>
-              <a:ea typeface="Consolas"/>
-              <a:cs typeface="Consolas"/>
-              <a:sym typeface="Consolas"/>
-            </a:endParaRPr>
-          </a:p>
-          <a:p>
-            <a:r>
-              <a:rPr lang="en-US" sz="1700" dirty="0"/>
-              <a:t>This will take a while for everything to run.  To immediately follow along with us today, you can also call the shared </a:t>
-            </a:r>
-            <a:r>
-              <a:rPr lang="en-US" sz="1700" dirty="0" err="1"/>
-              <a:t>conda</a:t>
-            </a:r>
-            <a:r>
-              <a:rPr lang="en-US" sz="1700" dirty="0"/>
-              <a:t> environment we created on KLC for you to use: </a:t>
-            </a:r>
-          </a:p>
-          <a:p>
-            <a:endParaRPr lang="en-US" sz="1800" dirty="0">
-              <a:solidFill>
-                <a:schemeClr val="dk1"/>
-              </a:solidFill>
-            </a:endParaRPr>
-          </a:p>
-          <a:p>
-            <a:pPr>
-              <a:buClr>
-                <a:schemeClr val="dk1"/>
-              </a:buClr>
-              <a:buSzPts val="1100"/>
-            </a:pPr>
-            <a:endParaRPr lang="en-US" sz="200" dirty="0">
-              <a:solidFill>
-                <a:schemeClr val="dk1"/>
-              </a:solidFill>
-              <a:highlight>
-                <a:srgbClr val="C0C0C0"/>
-              </a:highlight>
-            </a:endParaRPr>
-          </a:p>
-          <a:p>
-            <a:pPr marL="920750" lvl="4">
-              <a:buClr>
-                <a:schemeClr val="dk1"/>
-              </a:buClr>
-              <a:buSzPts val="1100"/>
-            </a:pPr>
-            <a:r>
-              <a:rPr lang="en-US" sz="1800" dirty="0">
-                <a:solidFill>
-                  <a:schemeClr val="dk1"/>
-                </a:solidFill>
-                <a:highlight>
-                  <a:srgbClr val="C0C0C0"/>
-                </a:highlight>
-                <a:latin typeface="Consolas"/>
-                <a:cs typeface="Consolas"/>
-              </a:rPr>
-              <a:t>module load </a:t>
-            </a:r>
-            <a:r>
-              <a:rPr lang="en-US" sz="1800" dirty="0" err="1">
-                <a:solidFill>
-                  <a:schemeClr val="dk1"/>
-                </a:solidFill>
-                <a:highlight>
-                  <a:srgbClr val="C0C0C0"/>
-                </a:highlight>
-                <a:latin typeface="Consolas"/>
-                <a:cs typeface="Consolas"/>
-              </a:rPr>
-              <a:t>micromamba</a:t>
-            </a:r>
-            <a:endParaRPr lang="en-US" sz="1800" dirty="0">
-              <a:solidFill>
-                <a:schemeClr val="dk1"/>
-              </a:solidFill>
-              <a:highlight>
-                <a:srgbClr val="C0C0C0"/>
-              </a:highlight>
-              <a:latin typeface="Consolas"/>
-              <a:cs typeface="Consolas"/>
-            </a:endParaRPr>
-          </a:p>
-          <a:p>
-            <a:pPr marL="920750" lvl="4">
-              <a:buClr>
-                <a:schemeClr val="dk1"/>
-              </a:buClr>
-              <a:buSzPts val="1100"/>
-            </a:pPr>
-            <a:r>
-              <a:rPr lang="en-US" sz="1800" dirty="0" err="1">
-                <a:solidFill>
-                  <a:schemeClr val="dk1"/>
-                </a:solidFill>
-                <a:highlight>
-                  <a:srgbClr val="C0C0C0"/>
-                </a:highlight>
-                <a:latin typeface="Consolas"/>
-                <a:cs typeface="Consolas"/>
-                <a:sym typeface="Consolas"/>
-              </a:rPr>
-              <a:t>micromamba</a:t>
-            </a:r>
-            <a:r>
-              <a:rPr lang="en-US" sz="1800" dirty="0">
-                <a:solidFill>
-                  <a:schemeClr val="dk1"/>
-                </a:solidFill>
-                <a:highlight>
-                  <a:srgbClr val="C0C0C0"/>
-                </a:highlight>
-                <a:latin typeface="Consolas"/>
-                <a:cs typeface="Consolas"/>
-                <a:sym typeface="Consolas"/>
-              </a:rPr>
-              <a:t> activate /</a:t>
-            </a:r>
-            <a:r>
-              <a:rPr lang="en-US" sz="1800" dirty="0" err="1">
-                <a:solidFill>
-                  <a:schemeClr val="dk1"/>
-                </a:solidFill>
-                <a:highlight>
-                  <a:srgbClr val="C0C0C0"/>
-                </a:highlight>
-                <a:latin typeface="Consolas"/>
-                <a:cs typeface="Consolas"/>
-                <a:sym typeface="Consolas"/>
-              </a:rPr>
-              <a:t>kellogg</a:t>
-            </a:r>
-            <a:r>
-              <a:rPr lang="en-US" sz="1800" dirty="0">
-                <a:solidFill>
-                  <a:schemeClr val="dk1"/>
-                </a:solidFill>
-                <a:highlight>
-                  <a:srgbClr val="C0C0C0"/>
-                </a:highlight>
-                <a:latin typeface="Consolas"/>
-                <a:cs typeface="Consolas"/>
-                <a:sym typeface="Consolas"/>
-              </a:rPr>
-              <a:t>/software/</a:t>
-            </a:r>
-            <a:r>
-              <a:rPr lang="en-US" sz="1800" dirty="0" err="1">
-                <a:solidFill>
-                  <a:schemeClr val="dk1"/>
-                </a:solidFill>
-                <a:highlight>
-                  <a:srgbClr val="C0C0C0"/>
-                </a:highlight>
-                <a:latin typeface="Consolas"/>
-                <a:cs typeface="Consolas"/>
-                <a:sym typeface="Consolas"/>
-              </a:rPr>
-              <a:t>envs</a:t>
-            </a:r>
-            <a:r>
-              <a:rPr lang="en-US" sz="1800" dirty="0">
-                <a:solidFill>
-                  <a:schemeClr val="dk1"/>
-                </a:solidFill>
-                <a:highlight>
-                  <a:srgbClr val="C0C0C0"/>
-                </a:highlight>
-                <a:latin typeface="Consolas"/>
-                <a:cs typeface="Consolas"/>
-                <a:sym typeface="Consolas"/>
-              </a:rPr>
-              <a:t>/wrds2_env</a:t>
-            </a:r>
-          </a:p>
-          <a:p>
-            <a:pPr>
-              <a:buClr>
-                <a:schemeClr val="dk1"/>
-              </a:buClr>
-              <a:buSzPts val="1100"/>
-            </a:pPr>
-            <a:endParaRPr sz="1800" dirty="0">
-              <a:solidFill>
-                <a:schemeClr val="dk1"/>
-              </a:solidFill>
-              <a:highlight>
-                <a:srgbClr val="CCCCCC"/>
-              </a:highlight>
-              <a:latin typeface="Consolas"/>
-              <a:ea typeface="Consolas"/>
-              <a:cs typeface="Consolas"/>
-              <a:sym typeface="Consolas"/>
-            </a:endParaRPr>
-          </a:p>
-        </p:txBody>
-      </p:sp>
-      <p:sp>
-        <p:nvSpPr>
-          <p:cNvPr id="3" name="Google Shape;94;ge58bbe3d21_0_49">
-            <a:extLst>
-              <a:ext uri="{FF2B5EF4-FFF2-40B4-BE49-F238E27FC236}">
-                <a16:creationId xmlns:a16="http://schemas.microsoft.com/office/drawing/2014/main" id="{9133911F-4802-28FD-084F-F3BF4019CC04}"/>
-              </a:ext>
-            </a:extLst>
-          </p:cNvPr>
-          <p:cNvSpPr txBox="1">
-            <a:spLocks noGrp="1"/>
-          </p:cNvSpPr>
-          <p:nvPr>
-            <p:ph type="ftr" idx="11"/>
-          </p:nvPr>
-        </p:nvSpPr>
-        <p:spPr>
-          <a:xfrm>
-            <a:off x="4572000" y="6506896"/>
-            <a:ext cx="4114800" cy="365100"/>
-          </a:xfrm>
-          <a:prstGeom prst="rect">
-            <a:avLst/>
-          </a:prstGeom>
-          <a:noFill/>
-          <a:ln>
-            <a:noFill/>
-          </a:ln>
-        </p:spPr>
-        <p:txBody>
-          <a:bodyPr spcFirstLastPara="1" wrap="square" lIns="91425" tIns="45700" rIns="91425" bIns="45700" anchor="ctr" anchorCtr="0">
-            <a:noAutofit/>
-          </a:bodyPr>
-          <a:lstStyle/>
-          <a:p>
-            <a:pPr marL="0" lvl="0" indent="0" algn="r" rtl="0">
-              <a:lnSpc>
-                <a:spcPct val="100000"/>
-              </a:lnSpc>
-              <a:spcBef>
-                <a:spcPts val="0"/>
-              </a:spcBef>
-              <a:spcAft>
-                <a:spcPts val="0"/>
-              </a:spcAft>
-              <a:buSzPts val="1400"/>
-              <a:buNone/>
-            </a:pPr>
-            <a:r>
-              <a:rPr lang="en-US" dirty="0"/>
-              <a:t>WRDS</a:t>
-            </a:r>
-            <a:endParaRPr dirty="0"/>
-          </a:p>
-        </p:txBody>
-      </p:sp>
-    </p:spTree>
-    <p:extLst>
-      <p:ext uri="{BB962C8B-B14F-4D97-AF65-F5344CB8AC3E}">
-        <p14:creationId xmlns:p14="http://schemas.microsoft.com/office/powerpoint/2010/main" val="1583231743"/>
-      </p:ext>
-    </p:extLst>
-  </p:cSld>
-  <p:clrMapOvr>
-    <a:masterClrMapping/>
-  </p:clrMapOvr>
-</p:sld>
-</file>
-
-<file path=ppt/slides/slide4.xml><?xml version="1.0" encoding="utf-8"?>
-<p:sld xmlns:a="http://schemas.openxmlformats.org/drawingml/2006/main" xmlns:r="http://schemas.openxmlformats.org/officeDocument/2006/relationships" xmlns:p="http://schemas.openxmlformats.org/presentationml/2006/main">
-  <p:cSld>
-    <p:spTree>
-      <p:nvGrpSpPr>
-        <p:cNvPr id="1" name="Shape 129"/>
-        <p:cNvGrpSpPr/>
-        <p:nvPr/>
-      </p:nvGrpSpPr>
-      <p:grpSpPr>
-        <a:xfrm>
-          <a:off x="0" y="0"/>
-          <a:ext cx="0" cy="0"/>
-          <a:chOff x="0" y="0"/>
-          <a:chExt cx="0" cy="0"/>
-        </a:xfrm>
-      </p:grpSpPr>
-      <p:sp>
-        <p:nvSpPr>
-          <p:cNvPr id="130" name="Google Shape;130;ge6d407e7a1_0_85"/>
-          <p:cNvSpPr txBox="1">
-            <a:spLocks noGrp="1"/>
-          </p:cNvSpPr>
-          <p:nvPr>
-            <p:ph type="title"/>
-          </p:nvPr>
-        </p:nvSpPr>
-        <p:spPr>
-          <a:xfrm>
-            <a:off x="457200" y="0"/>
-            <a:ext cx="8645700" cy="1143000"/>
-          </a:xfrm>
-          <a:prstGeom prst="rect">
-            <a:avLst/>
-          </a:prstGeom>
-          <a:noFill/>
-          <a:ln>
-            <a:noFill/>
-          </a:ln>
-        </p:spPr>
-        <p:txBody>
-          <a:bodyPr spcFirstLastPara="1" wrap="square" lIns="91425" tIns="45700" rIns="91425" bIns="45700" anchor="ctr" anchorCtr="0">
-            <a:noAutofit/>
-          </a:bodyPr>
-          <a:lstStyle/>
-          <a:p>
-            <a:pPr marL="0" lvl="0" indent="0" algn="l" rtl="0">
-              <a:lnSpc>
-                <a:spcPct val="100000"/>
-              </a:lnSpc>
-              <a:spcBef>
-                <a:spcPts val="0"/>
-              </a:spcBef>
-              <a:spcAft>
-                <a:spcPts val="0"/>
-              </a:spcAft>
-              <a:buSzPts val="3200"/>
-              <a:buNone/>
-            </a:pPr>
-            <a:r>
-              <a:rPr lang="en-US" dirty="0"/>
-              <a:t>Basic Commands</a:t>
-            </a:r>
-            <a:endParaRPr dirty="0"/>
-          </a:p>
-        </p:txBody>
-      </p:sp>
-      <p:sp>
-        <p:nvSpPr>
-          <p:cNvPr id="132" name="Google Shape;132;ge6d407e7a1_0_85"/>
-          <p:cNvSpPr txBox="1">
-            <a:spLocks noGrp="1"/>
-          </p:cNvSpPr>
-          <p:nvPr>
-            <p:ph type="sldNum" idx="12"/>
-          </p:nvPr>
-        </p:nvSpPr>
-        <p:spPr>
-          <a:xfrm>
-            <a:off x="8686800" y="6506896"/>
-            <a:ext cx="416100" cy="365100"/>
-          </a:xfrm>
-          <a:prstGeom prst="rect">
-            <a:avLst/>
-          </a:prstGeom>
-          <a:noFill/>
-          <a:ln>
-            <a:noFill/>
-          </a:ln>
-        </p:spPr>
-        <p:txBody>
-          <a:bodyPr spcFirstLastPara="1" wrap="square" lIns="91425" tIns="45700" rIns="91425" bIns="45700" anchor="ctr" anchorCtr="0">
-            <a:noAutofit/>
-          </a:bodyPr>
-          <a:lstStyle/>
-          <a:p>
-            <a:pPr marL="0" lvl="0" indent="0" algn="r" rtl="0">
-              <a:lnSpc>
-                <a:spcPct val="100000"/>
-              </a:lnSpc>
-              <a:spcBef>
-                <a:spcPts val="0"/>
-              </a:spcBef>
-              <a:spcAft>
-                <a:spcPts val="0"/>
-              </a:spcAft>
-              <a:buSzPts val="1000"/>
-              <a:buNone/>
-            </a:pPr>
-            <a:fld id="{00000000-1234-1234-1234-123412341234}" type="slidenum">
-              <a:rPr lang="en-US"/>
-              <a:t>4</a:t>
-            </a:fld>
-            <a:endParaRPr/>
-          </a:p>
-        </p:txBody>
-      </p:sp>
-      <p:sp>
-        <p:nvSpPr>
-          <p:cNvPr id="133" name="Google Shape;133;ge6d407e7a1_0_85"/>
-          <p:cNvSpPr txBox="1"/>
-          <p:nvPr/>
-        </p:nvSpPr>
-        <p:spPr>
-          <a:xfrm>
-            <a:off x="554325" y="873125"/>
-            <a:ext cx="8132400" cy="4616618"/>
-          </a:xfrm>
-          <a:prstGeom prst="rect">
-            <a:avLst/>
-          </a:prstGeom>
-          <a:noFill/>
-          <a:ln>
-            <a:noFill/>
-          </a:ln>
-        </p:spPr>
-        <p:txBody>
-          <a:bodyPr spcFirstLastPara="1" wrap="square" lIns="91425" tIns="91425" rIns="91425" bIns="91425" anchor="t" anchorCtr="0">
-            <a:spAutoFit/>
-          </a:bodyPr>
-          <a:lstStyle/>
-          <a:p>
-            <a:pPr marL="0" lvl="0" indent="0" algn="l" rtl="0">
-              <a:spcBef>
-                <a:spcPts val="0"/>
-              </a:spcBef>
-              <a:spcAft>
-                <a:spcPts val="0"/>
-              </a:spcAft>
-              <a:buClr>
-                <a:schemeClr val="dk1"/>
-              </a:buClr>
-              <a:buSzPts val="1100"/>
-              <a:buFont typeface="Arial"/>
-              <a:buNone/>
-            </a:pPr>
-            <a:r>
-              <a:rPr lang="en-US" sz="1800" dirty="0">
-                <a:solidFill>
-                  <a:schemeClr val="dk1"/>
-                </a:solidFill>
-              </a:rPr>
-              <a:t>To activate the environment in the future, either load mamba:</a:t>
-            </a:r>
-          </a:p>
-          <a:p>
-            <a:pPr marL="0" lvl="0" indent="0" algn="l" rtl="0">
-              <a:spcBef>
-                <a:spcPts val="0"/>
-              </a:spcBef>
-              <a:spcAft>
-                <a:spcPts val="0"/>
-              </a:spcAft>
-              <a:buClr>
-                <a:schemeClr val="dk1"/>
-              </a:buClr>
-              <a:buSzPts val="1100"/>
-              <a:buFont typeface="Arial"/>
-              <a:buNone/>
-            </a:pPr>
-            <a:endParaRPr lang="en-US" sz="1800" dirty="0">
-              <a:solidFill>
-                <a:schemeClr val="dk1"/>
-              </a:solidFill>
-            </a:endParaRPr>
-          </a:p>
-          <a:p>
-            <a:pPr lvl="0" indent="920750" algn="l" rtl="0">
-              <a:spcBef>
-                <a:spcPts val="0"/>
-              </a:spcBef>
-              <a:spcAft>
-                <a:spcPts val="0"/>
-              </a:spcAft>
-              <a:buClr>
-                <a:schemeClr val="dk1"/>
-              </a:buClr>
-              <a:buSzPts val="1100"/>
-              <a:buFont typeface="Arial"/>
-              <a:buNone/>
-            </a:pPr>
-            <a:r>
-              <a:rPr lang="en-US" sz="1800" dirty="0">
-                <a:solidFill>
-                  <a:schemeClr val="dk1"/>
-                </a:solidFill>
-                <a:latin typeface="Consolas"/>
-                <a:cs typeface="Consolas"/>
-              </a:rPr>
-              <a:t>   </a:t>
-            </a:r>
-            <a:r>
-              <a:rPr lang="en-US" sz="1800" dirty="0">
-                <a:solidFill>
-                  <a:schemeClr val="dk1"/>
-                </a:solidFill>
-                <a:highlight>
-                  <a:srgbClr val="C0C0C0"/>
-                </a:highlight>
-                <a:latin typeface="Consolas"/>
-                <a:cs typeface="Consolas"/>
-              </a:rPr>
-              <a:t>module load </a:t>
-            </a:r>
-            <a:r>
-              <a:rPr lang="en-US" sz="1800" dirty="0" err="1">
-                <a:solidFill>
-                  <a:schemeClr val="dk1"/>
-                </a:solidFill>
-                <a:highlight>
-                  <a:srgbClr val="C0C0C0"/>
-                </a:highlight>
-                <a:latin typeface="Consolas"/>
-                <a:cs typeface="Consolas"/>
-              </a:rPr>
-              <a:t>micromamba</a:t>
-            </a:r>
-            <a:r>
-              <a:rPr lang="en-US" sz="1800" dirty="0">
-                <a:solidFill>
-                  <a:schemeClr val="dk1"/>
-                </a:solidFill>
-                <a:highlight>
-                  <a:srgbClr val="C0C0C0"/>
-                </a:highlight>
-                <a:latin typeface="Consolas"/>
-                <a:cs typeface="Consolas"/>
-              </a:rPr>
-              <a:t> </a:t>
-            </a:r>
-          </a:p>
-          <a:p>
-            <a:pPr marL="0" lvl="0" indent="0" algn="l" rtl="0">
-              <a:spcBef>
-                <a:spcPts val="0"/>
-              </a:spcBef>
-              <a:spcAft>
-                <a:spcPts val="0"/>
-              </a:spcAft>
-              <a:buClr>
-                <a:schemeClr val="dk1"/>
-              </a:buClr>
-              <a:buSzPts val="1100"/>
-              <a:buFont typeface="Arial"/>
-              <a:buNone/>
-            </a:pPr>
-            <a:endParaRPr lang="en-US" sz="1800" dirty="0">
-              <a:solidFill>
-                <a:schemeClr val="dk1"/>
-              </a:solidFill>
-            </a:endParaRPr>
-          </a:p>
-          <a:p>
-            <a:pPr>
-              <a:buClr>
-                <a:schemeClr val="dk1"/>
-              </a:buClr>
-              <a:buSzPts val="1100"/>
-            </a:pPr>
-            <a:r>
-              <a:rPr lang="en-US" sz="1800" dirty="0">
-                <a:solidFill>
-                  <a:schemeClr val="dk1"/>
-                </a:solidFill>
-              </a:rPr>
-              <a:t>Then run this line to activate the local R environment you created:</a:t>
-            </a:r>
-          </a:p>
-          <a:p>
-            <a:pPr marL="0" lvl="0" indent="0" algn="l" rtl="0">
-              <a:spcBef>
-                <a:spcPts val="0"/>
-              </a:spcBef>
-              <a:spcAft>
-                <a:spcPts val="0"/>
-              </a:spcAft>
-              <a:buClr>
-                <a:schemeClr val="dk1"/>
-              </a:buClr>
-              <a:buSzPts val="1100"/>
-              <a:buFont typeface="Arial"/>
-              <a:buNone/>
-            </a:pPr>
-            <a:endParaRPr lang="en-US" sz="1800" dirty="0">
-              <a:solidFill>
-                <a:schemeClr val="dk1"/>
-              </a:solidFill>
-            </a:endParaRPr>
-          </a:p>
-          <a:p>
-            <a:pPr lvl="0" indent="920750" algn="l" rtl="0">
-              <a:spcBef>
-                <a:spcPts val="0"/>
-              </a:spcBef>
-              <a:spcAft>
-                <a:spcPts val="0"/>
-              </a:spcAft>
-              <a:buClr>
-                <a:schemeClr val="dk1"/>
-              </a:buClr>
-              <a:buSzPts val="1100"/>
-              <a:buFont typeface="Arial"/>
-              <a:buNone/>
-            </a:pPr>
-            <a:r>
-              <a:rPr lang="en-US" sz="1700" dirty="0">
-                <a:solidFill>
-                  <a:schemeClr val="dk1"/>
-                </a:solidFill>
-                <a:latin typeface="Consolas"/>
-                <a:ea typeface="Consolas"/>
-                <a:cs typeface="Consolas"/>
-                <a:sym typeface="Consolas"/>
-              </a:rPr>
-              <a:t>   </a:t>
-            </a:r>
-            <a:r>
-              <a:rPr lang="en-US" sz="1800" dirty="0" err="1">
-                <a:solidFill>
-                  <a:schemeClr val="dk1"/>
-                </a:solidFill>
-                <a:highlight>
-                  <a:srgbClr val="C0C0C0"/>
-                </a:highlight>
-                <a:latin typeface="Consolas"/>
-                <a:ea typeface="Consolas"/>
-                <a:cs typeface="Consolas"/>
-                <a:sym typeface="Consolas"/>
-              </a:rPr>
-              <a:t>micromamba</a:t>
-            </a:r>
-            <a:r>
-              <a:rPr lang="en-US" sz="1800" dirty="0">
-                <a:solidFill>
-                  <a:schemeClr val="dk1"/>
-                </a:solidFill>
-                <a:highlight>
-                  <a:srgbClr val="C0C0C0"/>
-                </a:highlight>
-                <a:latin typeface="Consolas"/>
-                <a:ea typeface="Consolas"/>
-                <a:cs typeface="Consolas"/>
-                <a:sym typeface="Consolas"/>
-              </a:rPr>
-              <a:t> activate wrds2_env</a:t>
-            </a:r>
-          </a:p>
-          <a:p>
-            <a:pPr marL="0" lvl="0" indent="0" algn="l" rtl="0">
-              <a:spcBef>
-                <a:spcPts val="0"/>
-              </a:spcBef>
-              <a:spcAft>
-                <a:spcPts val="0"/>
-              </a:spcAft>
-              <a:buClr>
-                <a:schemeClr val="dk1"/>
-              </a:buClr>
-              <a:buSzPts val="1100"/>
-              <a:buFont typeface="Arial"/>
-              <a:buNone/>
-            </a:pPr>
-            <a:endParaRPr sz="1800" dirty="0">
-              <a:solidFill>
-                <a:schemeClr val="dk1"/>
-              </a:solidFill>
-              <a:highlight>
-                <a:srgbClr val="CCCCCC"/>
-              </a:highlight>
-              <a:latin typeface="Consolas"/>
-              <a:ea typeface="Consolas"/>
-              <a:cs typeface="Consolas"/>
-              <a:sym typeface="Consolas"/>
-            </a:endParaRPr>
-          </a:p>
-          <a:p>
-            <a:pPr marL="0" lvl="0" indent="0" algn="l" rtl="0">
-              <a:spcBef>
-                <a:spcPts val="0"/>
-              </a:spcBef>
-              <a:spcAft>
-                <a:spcPts val="0"/>
-              </a:spcAft>
-              <a:buClr>
-                <a:schemeClr val="dk1"/>
-              </a:buClr>
-              <a:buSzPts val="1100"/>
-              <a:buFont typeface="Arial"/>
-              <a:buNone/>
-            </a:pPr>
-            <a:r>
-              <a:rPr lang="en-US" sz="1800" dirty="0">
-                <a:solidFill>
-                  <a:schemeClr val="dk1"/>
-                </a:solidFill>
-              </a:rPr>
-              <a:t>To leave the environment:</a:t>
-            </a:r>
-            <a:endParaRPr sz="1800" dirty="0">
-              <a:solidFill>
-                <a:schemeClr val="dk1"/>
-              </a:solidFill>
-            </a:endParaRPr>
-          </a:p>
-          <a:p>
-            <a:pPr marL="0" lvl="0" indent="0" algn="l" rtl="0">
-              <a:spcBef>
-                <a:spcPts val="0"/>
-              </a:spcBef>
-              <a:spcAft>
-                <a:spcPts val="0"/>
-              </a:spcAft>
-              <a:buClr>
-                <a:schemeClr val="dk1"/>
-              </a:buClr>
-              <a:buSzPts val="1100"/>
-              <a:buFont typeface="Arial"/>
-              <a:buNone/>
-            </a:pPr>
-            <a:endParaRPr sz="1800" dirty="0">
-              <a:solidFill>
-                <a:schemeClr val="dk1"/>
-              </a:solidFill>
-            </a:endParaRPr>
-          </a:p>
-          <a:p>
-            <a:pPr lvl="0" indent="920750" algn="l" rtl="0">
-              <a:spcBef>
-                <a:spcPts val="0"/>
-              </a:spcBef>
-              <a:spcAft>
-                <a:spcPts val="0"/>
-              </a:spcAft>
-              <a:buClr>
-                <a:schemeClr val="dk1"/>
-              </a:buClr>
-              <a:buSzPts val="1100"/>
-              <a:buFont typeface="Arial"/>
-              <a:buNone/>
-            </a:pPr>
-            <a:r>
-              <a:rPr lang="en-US" sz="1700" dirty="0">
-                <a:solidFill>
-                  <a:schemeClr val="dk1"/>
-                </a:solidFill>
-                <a:latin typeface="Consolas"/>
-                <a:ea typeface="Consolas"/>
-                <a:cs typeface="Consolas"/>
-                <a:sym typeface="Consolas"/>
-              </a:rPr>
-              <a:t>   </a:t>
-            </a:r>
-            <a:r>
-              <a:rPr lang="en-US" sz="1800" dirty="0" err="1">
-                <a:solidFill>
-                  <a:schemeClr val="dk1"/>
-                </a:solidFill>
-                <a:highlight>
-                  <a:srgbClr val="CCCCCC"/>
-                </a:highlight>
-                <a:latin typeface="Consolas"/>
-                <a:ea typeface="Consolas"/>
-                <a:cs typeface="Consolas"/>
-                <a:sym typeface="Consolas"/>
-              </a:rPr>
-              <a:t>micromamba</a:t>
-            </a:r>
-            <a:r>
-              <a:rPr lang="en-US" sz="1800" dirty="0">
-                <a:solidFill>
-                  <a:schemeClr val="dk1"/>
-                </a:solidFill>
-                <a:highlight>
-                  <a:srgbClr val="CCCCCC"/>
-                </a:highlight>
-                <a:latin typeface="Consolas"/>
-                <a:ea typeface="Consolas"/>
-                <a:cs typeface="Consolas"/>
-                <a:sym typeface="Consolas"/>
-              </a:rPr>
-              <a:t> deactivate wrds2_env</a:t>
-            </a:r>
-            <a:endParaRPr sz="1800" dirty="0">
-              <a:solidFill>
-                <a:schemeClr val="dk1"/>
-              </a:solidFill>
-              <a:highlight>
-                <a:srgbClr val="CCCCCC"/>
-              </a:highlight>
-              <a:latin typeface="Consolas"/>
-              <a:ea typeface="Consolas"/>
-              <a:cs typeface="Consolas"/>
-              <a:sym typeface="Consolas"/>
-            </a:endParaRPr>
-          </a:p>
-          <a:p>
-            <a:pPr marL="0" lvl="0" indent="0" algn="l" rtl="0">
-              <a:spcBef>
-                <a:spcPts val="0"/>
-              </a:spcBef>
-              <a:spcAft>
-                <a:spcPts val="0"/>
-              </a:spcAft>
-              <a:buClr>
-                <a:schemeClr val="dk1"/>
-              </a:buClr>
-              <a:buSzPts val="1100"/>
-              <a:buFont typeface="Arial"/>
-              <a:buNone/>
-            </a:pPr>
-            <a:endParaRPr sz="1800" dirty="0">
-              <a:solidFill>
-                <a:schemeClr val="dk1"/>
-              </a:solidFill>
-              <a:highlight>
-                <a:srgbClr val="CCCCCC"/>
-              </a:highlight>
-              <a:latin typeface="Consolas"/>
-              <a:ea typeface="Consolas"/>
-              <a:cs typeface="Consolas"/>
-              <a:sym typeface="Consolas"/>
-            </a:endParaRPr>
-          </a:p>
-          <a:p>
-            <a:pPr marL="0" lvl="0" indent="0" algn="l" rtl="0">
-              <a:spcBef>
-                <a:spcPts val="0"/>
-              </a:spcBef>
-              <a:spcAft>
-                <a:spcPts val="0"/>
-              </a:spcAft>
-              <a:buClr>
-                <a:schemeClr val="dk1"/>
-              </a:buClr>
-              <a:buSzPts val="1100"/>
-              <a:buFont typeface="Arial"/>
-              <a:buNone/>
-            </a:pPr>
-            <a:r>
-              <a:rPr lang="en-US" sz="1800" dirty="0">
-                <a:solidFill>
-                  <a:schemeClr val="dk1"/>
-                </a:solidFill>
-              </a:rPr>
-              <a:t>To output the </a:t>
-            </a:r>
-            <a:r>
-              <a:rPr lang="en-US" sz="1800" dirty="0" err="1">
-                <a:solidFill>
-                  <a:schemeClr val="dk1"/>
-                </a:solidFill>
-              </a:rPr>
-              <a:t>yaml</a:t>
-            </a:r>
-            <a:r>
-              <a:rPr lang="en-US" sz="1800" dirty="0">
-                <a:solidFill>
-                  <a:schemeClr val="dk1"/>
-                </a:solidFill>
-              </a:rPr>
-              <a:t> file so you can share your environment with others:</a:t>
-            </a:r>
-          </a:p>
-          <a:p>
-            <a:pPr marL="0" lvl="0" indent="0" algn="l" rtl="0">
-              <a:spcBef>
-                <a:spcPts val="0"/>
-              </a:spcBef>
-              <a:spcAft>
-                <a:spcPts val="0"/>
-              </a:spcAft>
-              <a:buClr>
-                <a:schemeClr val="dk1"/>
-              </a:buClr>
-              <a:buSzPts val="1100"/>
-              <a:buFont typeface="Arial"/>
-              <a:buNone/>
-            </a:pPr>
-            <a:endParaRPr lang="en-US" sz="1800" dirty="0">
-              <a:solidFill>
-                <a:schemeClr val="dk1"/>
-              </a:solidFill>
-            </a:endParaRPr>
-          </a:p>
-          <a:p>
-            <a:pPr lvl="0" indent="920750" algn="l" rtl="0">
-              <a:spcBef>
-                <a:spcPts val="0"/>
-              </a:spcBef>
-              <a:spcAft>
-                <a:spcPts val="0"/>
-              </a:spcAft>
-              <a:buClr>
-                <a:schemeClr val="dk1"/>
-              </a:buClr>
-              <a:buSzPts val="1100"/>
-              <a:buFont typeface="Arial"/>
-              <a:buNone/>
-            </a:pPr>
-            <a:r>
-              <a:rPr lang="en-US" sz="1800" dirty="0">
-                <a:solidFill>
-                  <a:schemeClr val="dk1"/>
-                </a:solidFill>
-                <a:ea typeface="Consolas"/>
-              </a:rPr>
-              <a:t>      </a:t>
-            </a:r>
-            <a:r>
-              <a:rPr lang="en-US" sz="1800" dirty="0" err="1">
-                <a:solidFill>
-                  <a:schemeClr val="dk1"/>
-                </a:solidFill>
-                <a:highlight>
-                  <a:srgbClr val="CCCCCC"/>
-                </a:highlight>
-                <a:latin typeface="Consolas"/>
-                <a:ea typeface="Consolas"/>
-                <a:cs typeface="Consolas"/>
-                <a:sym typeface="Consolas"/>
-              </a:rPr>
-              <a:t>conda</a:t>
-            </a:r>
-            <a:r>
-              <a:rPr lang="en-US" sz="1800" dirty="0">
-                <a:solidFill>
-                  <a:schemeClr val="dk1"/>
-                </a:solidFill>
-                <a:highlight>
-                  <a:srgbClr val="CCCCCC"/>
-                </a:highlight>
-                <a:latin typeface="Consolas"/>
-                <a:ea typeface="Consolas"/>
-                <a:cs typeface="Consolas"/>
-                <a:sym typeface="Consolas"/>
-              </a:rPr>
-              <a:t> env export &gt; wrds2_env.yml</a:t>
-            </a:r>
-          </a:p>
-          <a:p>
-            <a:pPr marL="0" lvl="0" indent="0" algn="l" rtl="0">
-              <a:spcBef>
-                <a:spcPts val="0"/>
-              </a:spcBef>
-              <a:spcAft>
-                <a:spcPts val="0"/>
-              </a:spcAft>
-              <a:buClr>
-                <a:schemeClr val="dk1"/>
-              </a:buClr>
-              <a:buSzPts val="1100"/>
-              <a:buFont typeface="Arial"/>
-              <a:buNone/>
-            </a:pPr>
-            <a:endParaRPr lang="en-US" sz="1800" dirty="0">
-              <a:solidFill>
-                <a:schemeClr val="dk1"/>
-              </a:solidFill>
-              <a:highlight>
-                <a:srgbClr val="CCCCCC"/>
-              </a:highlight>
-              <a:latin typeface="Consolas"/>
-              <a:cs typeface="Consolas"/>
-              <a:sym typeface="Consolas"/>
-            </a:endParaRPr>
-          </a:p>
-        </p:txBody>
-      </p:sp>
-      <p:sp>
-        <p:nvSpPr>
-          <p:cNvPr id="3" name="Google Shape;94;ge58bbe3d21_0_49">
-            <a:extLst>
-              <a:ext uri="{FF2B5EF4-FFF2-40B4-BE49-F238E27FC236}">
-                <a16:creationId xmlns:a16="http://schemas.microsoft.com/office/drawing/2014/main" id="{9133911F-4802-28FD-084F-F3BF4019CC04}"/>
-              </a:ext>
-            </a:extLst>
-          </p:cNvPr>
-          <p:cNvSpPr txBox="1">
-            <a:spLocks noGrp="1"/>
-          </p:cNvSpPr>
-          <p:nvPr>
-            <p:ph type="ftr" idx="11"/>
-          </p:nvPr>
-        </p:nvSpPr>
-        <p:spPr>
-          <a:xfrm>
-            <a:off x="4572000" y="6506896"/>
-            <a:ext cx="4114800" cy="365100"/>
-          </a:xfrm>
-          <a:prstGeom prst="rect">
-            <a:avLst/>
-          </a:prstGeom>
-          <a:noFill/>
-          <a:ln>
-            <a:noFill/>
-          </a:ln>
-        </p:spPr>
-        <p:txBody>
-          <a:bodyPr spcFirstLastPara="1" wrap="square" lIns="91425" tIns="45700" rIns="91425" bIns="45700" anchor="ctr" anchorCtr="0">
-            <a:noAutofit/>
-          </a:bodyPr>
-          <a:lstStyle/>
-          <a:p>
-            <a:pPr marL="0" lvl="0" indent="0" algn="r" rtl="0">
-              <a:lnSpc>
-                <a:spcPct val="100000"/>
-              </a:lnSpc>
-              <a:spcBef>
-                <a:spcPts val="0"/>
-              </a:spcBef>
-              <a:spcAft>
-                <a:spcPts val="0"/>
-              </a:spcAft>
-              <a:buSzPts val="1400"/>
-              <a:buNone/>
-            </a:pPr>
-            <a:r>
-              <a:rPr lang="en-US" dirty="0"/>
-              <a:t>WRDS</a:t>
-            </a:r>
-            <a:endParaRPr dirty="0"/>
-          </a:p>
-        </p:txBody>
-      </p:sp>
-    </p:spTree>
-    <p:extLst>
-      <p:ext uri="{BB962C8B-B14F-4D97-AF65-F5344CB8AC3E}">
-        <p14:creationId xmlns:p14="http://schemas.microsoft.com/office/powerpoint/2010/main" val="501469167"/>
       </p:ext>
     </p:extLst>
   </p:cSld>

</xml_diff>